<commit_message>
Lista de componentes de fabricación y selección
</commit_message>
<xml_diff>
--- a/Plant Simulation/Componentes de la bicicleta.pptx
+++ b/Plant Simulation/Componentes de la bicicleta.pptx
@@ -6,6 +6,8 @@
   </p:sldMasterIdLst>
   <p:sldIdLst>
     <p:sldId id="256" r:id="rId2"/>
+    <p:sldId id="257" r:id="rId3"/>
+    <p:sldId id="258" r:id="rId4"/>
   </p:sldIdLst>
   <p:sldSz cx="12192000" cy="6858000"/>
   <p:notesSz cx="6858000" cy="9144000"/>
@@ -3564,7 +3566,6 @@
               <a:rPr lang="es-CO" sz="1400" dirty="0" smtClean="0"/>
               <a:t>Buje</a:t>
             </a:r>
-            <a:endParaRPr lang="es-CO" sz="1400" dirty="0" smtClean="0"/>
           </a:p>
           <a:p>
             <a:pPr marL="342900" indent="-342900">
@@ -3574,7 +3575,6 @@
               <a:rPr lang="es-CO" sz="1400" dirty="0" smtClean="0"/>
               <a:t>Freno</a:t>
             </a:r>
-            <a:endParaRPr lang="es-CO" sz="1400" dirty="0" smtClean="0"/>
           </a:p>
           <a:p>
             <a:pPr marL="342900" indent="-342900">
@@ -3668,7 +3668,6 @@
               <a:rPr lang="es-CO" sz="1400" dirty="0" smtClean="0"/>
               <a:t>Punteras</a:t>
             </a:r>
-            <a:endParaRPr lang="es-CO" sz="1400" dirty="0" smtClean="0"/>
           </a:p>
           <a:p>
             <a:pPr marL="342900" indent="-342900">
@@ -3696,7 +3695,6 @@
               <a:rPr lang="es-CO" sz="1400" dirty="0" smtClean="0"/>
               <a:t>Pedalier</a:t>
             </a:r>
-            <a:endParaRPr lang="es-CO" sz="1400" dirty="0" smtClean="0"/>
           </a:p>
         </p:txBody>
       </p:sp>
@@ -3724,8 +3722,8 @@
           </a:prstGeom>
         </p:spPr>
       </p:pic>
-      <mc:AlternateContent xmlns:mc="http://schemas.openxmlformats.org/markup-compatibility/2006">
-        <mc:Choice xmlns:a14="http://schemas.microsoft.com/office/drawing/2010/main" Requires="a14">
+      <mc:AlternateContent xmlns:mc="http://schemas.openxmlformats.org/markup-compatibility/2006" xmlns:a14="http://schemas.microsoft.com/office/drawing/2010/main">
+        <mc:Choice Requires="a14">
           <p:sp>
             <p:nvSpPr>
               <p:cNvPr id="33" name="CuadroTexto 32"/>
@@ -3776,7 +3774,7 @@
             </p:txBody>
           </p:sp>
         </mc:Choice>
-        <mc:Fallback>
+        <mc:Fallback xmlns="">
           <p:sp>
             <p:nvSpPr>
               <p:cNvPr id="33" name="CuadroTexto 32"/>
@@ -3815,8 +3813,8 @@
           </p:sp>
         </mc:Fallback>
       </mc:AlternateContent>
-      <mc:AlternateContent xmlns:mc="http://schemas.openxmlformats.org/markup-compatibility/2006">
-        <mc:Choice xmlns:a14="http://schemas.microsoft.com/office/drawing/2010/main" Requires="a14">
+      <mc:AlternateContent xmlns:mc="http://schemas.openxmlformats.org/markup-compatibility/2006" xmlns:a14="http://schemas.microsoft.com/office/drawing/2010/main">
+        <mc:Choice Requires="a14">
           <p:sp>
             <p:nvSpPr>
               <p:cNvPr id="34" name="CuadroTexto 33"/>
@@ -3867,7 +3865,7 @@
             </p:txBody>
           </p:sp>
         </mc:Choice>
-        <mc:Fallback>
+        <mc:Fallback xmlns="">
           <p:sp>
             <p:nvSpPr>
               <p:cNvPr id="34" name="CuadroTexto 33"/>
@@ -3906,8 +3904,8 @@
           </p:sp>
         </mc:Fallback>
       </mc:AlternateContent>
-      <mc:AlternateContent xmlns:mc="http://schemas.openxmlformats.org/markup-compatibility/2006">
-        <mc:Choice xmlns:a14="http://schemas.microsoft.com/office/drawing/2010/main" Requires="a14">
+      <mc:AlternateContent xmlns:mc="http://schemas.openxmlformats.org/markup-compatibility/2006" xmlns:a14="http://schemas.microsoft.com/office/drawing/2010/main">
+        <mc:Choice Requires="a14">
           <p:sp>
             <p:nvSpPr>
               <p:cNvPr id="35" name="CuadroTexto 34"/>
@@ -3958,7 +3956,7 @@
             </p:txBody>
           </p:sp>
         </mc:Choice>
-        <mc:Fallback>
+        <mc:Fallback xmlns="">
           <p:sp>
             <p:nvSpPr>
               <p:cNvPr id="35" name="CuadroTexto 34"/>
@@ -3997,8 +3995,8 @@
           </p:sp>
         </mc:Fallback>
       </mc:AlternateContent>
-      <mc:AlternateContent xmlns:mc="http://schemas.openxmlformats.org/markup-compatibility/2006">
-        <mc:Choice xmlns:a14="http://schemas.microsoft.com/office/drawing/2010/main" Requires="a14">
+      <mc:AlternateContent xmlns:mc="http://schemas.openxmlformats.org/markup-compatibility/2006" xmlns:a14="http://schemas.microsoft.com/office/drawing/2010/main">
+        <mc:Choice Requires="a14">
           <p:sp>
             <p:nvSpPr>
               <p:cNvPr id="36" name="CuadroTexto 35"/>
@@ -4049,7 +4047,7 @@
             </p:txBody>
           </p:sp>
         </mc:Choice>
-        <mc:Fallback>
+        <mc:Fallback xmlns="">
           <p:sp>
             <p:nvSpPr>
               <p:cNvPr id="36" name="CuadroTexto 35"/>
@@ -4088,8 +4086,8 @@
           </p:sp>
         </mc:Fallback>
       </mc:AlternateContent>
-      <mc:AlternateContent xmlns:mc="http://schemas.openxmlformats.org/markup-compatibility/2006">
-        <mc:Choice xmlns:a14="http://schemas.microsoft.com/office/drawing/2010/main" Requires="a14">
+      <mc:AlternateContent xmlns:mc="http://schemas.openxmlformats.org/markup-compatibility/2006" xmlns:a14="http://schemas.microsoft.com/office/drawing/2010/main">
+        <mc:Choice Requires="a14">
           <p:sp>
             <p:nvSpPr>
               <p:cNvPr id="37" name="CuadroTexto 36"/>
@@ -4140,7 +4138,7 @@
             </p:txBody>
           </p:sp>
         </mc:Choice>
-        <mc:Fallback>
+        <mc:Fallback xmlns="">
           <p:sp>
             <p:nvSpPr>
               <p:cNvPr id="37" name="CuadroTexto 36"/>
@@ -4179,8 +4177,8 @@
           </p:sp>
         </mc:Fallback>
       </mc:AlternateContent>
-      <mc:AlternateContent xmlns:mc="http://schemas.openxmlformats.org/markup-compatibility/2006">
-        <mc:Choice xmlns:a14="http://schemas.microsoft.com/office/drawing/2010/main" Requires="a14">
+      <mc:AlternateContent xmlns:mc="http://schemas.openxmlformats.org/markup-compatibility/2006" xmlns:a14="http://schemas.microsoft.com/office/drawing/2010/main">
+        <mc:Choice Requires="a14">
           <p:sp>
             <p:nvSpPr>
               <p:cNvPr id="38" name="CuadroTexto 37"/>
@@ -4231,7 +4229,7 @@
             </p:txBody>
           </p:sp>
         </mc:Choice>
-        <mc:Fallback>
+        <mc:Fallback xmlns="">
           <p:sp>
             <p:nvSpPr>
               <p:cNvPr id="38" name="CuadroTexto 37"/>
@@ -4270,8 +4268,8 @@
           </p:sp>
         </mc:Fallback>
       </mc:AlternateContent>
-      <mc:AlternateContent xmlns:mc="http://schemas.openxmlformats.org/markup-compatibility/2006">
-        <mc:Choice xmlns:a14="http://schemas.microsoft.com/office/drawing/2010/main" Requires="a14">
+      <mc:AlternateContent xmlns:mc="http://schemas.openxmlformats.org/markup-compatibility/2006" xmlns:a14="http://schemas.microsoft.com/office/drawing/2010/main">
+        <mc:Choice Requires="a14">
           <p:sp>
             <p:nvSpPr>
               <p:cNvPr id="39" name="CuadroTexto 38"/>
@@ -4322,7 +4320,7 @@
             </p:txBody>
           </p:sp>
         </mc:Choice>
-        <mc:Fallback>
+        <mc:Fallback xmlns="">
           <p:sp>
             <p:nvSpPr>
               <p:cNvPr id="39" name="CuadroTexto 38"/>
@@ -4361,8 +4359,8 @@
           </p:sp>
         </mc:Fallback>
       </mc:AlternateContent>
-      <mc:AlternateContent xmlns:mc="http://schemas.openxmlformats.org/markup-compatibility/2006">
-        <mc:Choice xmlns:a14="http://schemas.microsoft.com/office/drawing/2010/main" Requires="a14">
+      <mc:AlternateContent xmlns:mc="http://schemas.openxmlformats.org/markup-compatibility/2006" xmlns:a14="http://schemas.microsoft.com/office/drawing/2010/main">
+        <mc:Choice Requires="a14">
           <p:sp>
             <p:nvSpPr>
               <p:cNvPr id="40" name="CuadroTexto 39"/>
@@ -4413,7 +4411,7 @@
             </p:txBody>
           </p:sp>
         </mc:Choice>
-        <mc:Fallback>
+        <mc:Fallback xmlns="">
           <p:sp>
             <p:nvSpPr>
               <p:cNvPr id="40" name="CuadroTexto 39"/>
@@ -4452,8 +4450,8 @@
           </p:sp>
         </mc:Fallback>
       </mc:AlternateContent>
-      <mc:AlternateContent xmlns:mc="http://schemas.openxmlformats.org/markup-compatibility/2006">
-        <mc:Choice xmlns:a14="http://schemas.microsoft.com/office/drawing/2010/main" Requires="a14">
+      <mc:AlternateContent xmlns:mc="http://schemas.openxmlformats.org/markup-compatibility/2006" xmlns:a14="http://schemas.microsoft.com/office/drawing/2010/main">
+        <mc:Choice Requires="a14">
           <p:sp>
             <p:nvSpPr>
               <p:cNvPr id="42" name="CuadroTexto 41"/>
@@ -4504,7 +4502,7 @@
             </p:txBody>
           </p:sp>
         </mc:Choice>
-        <mc:Fallback>
+        <mc:Fallback xmlns="">
           <p:sp>
             <p:nvSpPr>
               <p:cNvPr id="42" name="CuadroTexto 41"/>
@@ -4543,8 +4541,8 @@
           </p:sp>
         </mc:Fallback>
       </mc:AlternateContent>
-      <mc:AlternateContent xmlns:mc="http://schemas.openxmlformats.org/markup-compatibility/2006">
-        <mc:Choice xmlns:a14="http://schemas.microsoft.com/office/drawing/2010/main" Requires="a14">
+      <mc:AlternateContent xmlns:mc="http://schemas.openxmlformats.org/markup-compatibility/2006" xmlns:a14="http://schemas.microsoft.com/office/drawing/2010/main">
+        <mc:Choice Requires="a14">
           <p:sp>
             <p:nvSpPr>
               <p:cNvPr id="43" name="CuadroTexto 42"/>
@@ -4595,7 +4593,7 @@
             </p:txBody>
           </p:sp>
         </mc:Choice>
-        <mc:Fallback>
+        <mc:Fallback xmlns="">
           <p:sp>
             <p:nvSpPr>
               <p:cNvPr id="43" name="CuadroTexto 42"/>
@@ -4634,8 +4632,8 @@
           </p:sp>
         </mc:Fallback>
       </mc:AlternateContent>
-      <mc:AlternateContent xmlns:mc="http://schemas.openxmlformats.org/markup-compatibility/2006">
-        <mc:Choice xmlns:a14="http://schemas.microsoft.com/office/drawing/2010/main" Requires="a14">
+      <mc:AlternateContent xmlns:mc="http://schemas.openxmlformats.org/markup-compatibility/2006" xmlns:a14="http://schemas.microsoft.com/office/drawing/2010/main">
+        <mc:Choice Requires="a14">
           <p:sp>
             <p:nvSpPr>
               <p:cNvPr id="44" name="CuadroTexto 43"/>
@@ -4686,7 +4684,7 @@
             </p:txBody>
           </p:sp>
         </mc:Choice>
-        <mc:Fallback>
+        <mc:Fallback xmlns="">
           <p:sp>
             <p:nvSpPr>
               <p:cNvPr id="44" name="CuadroTexto 43"/>
@@ -4725,8 +4723,8 @@
           </p:sp>
         </mc:Fallback>
       </mc:AlternateContent>
-      <mc:AlternateContent xmlns:mc="http://schemas.openxmlformats.org/markup-compatibility/2006">
-        <mc:Choice xmlns:a14="http://schemas.microsoft.com/office/drawing/2010/main" Requires="a14">
+      <mc:AlternateContent xmlns:mc="http://schemas.openxmlformats.org/markup-compatibility/2006" xmlns:a14="http://schemas.microsoft.com/office/drawing/2010/main">
+        <mc:Choice Requires="a14">
           <p:sp>
             <p:nvSpPr>
               <p:cNvPr id="45" name="CuadroTexto 44"/>
@@ -4777,7 +4775,7 @@
             </p:txBody>
           </p:sp>
         </mc:Choice>
-        <mc:Fallback>
+        <mc:Fallback xmlns="">
           <p:sp>
             <p:nvSpPr>
               <p:cNvPr id="45" name="CuadroTexto 44"/>
@@ -4840,8 +4838,8 @@
           </a:prstGeom>
         </p:spPr>
       </p:pic>
-      <mc:AlternateContent xmlns:mc="http://schemas.openxmlformats.org/markup-compatibility/2006">
-        <mc:Choice xmlns:a14="http://schemas.microsoft.com/office/drawing/2010/main" Requires="a14">
+      <mc:AlternateContent xmlns:mc="http://schemas.openxmlformats.org/markup-compatibility/2006" xmlns:a14="http://schemas.microsoft.com/office/drawing/2010/main">
+        <mc:Choice Requires="a14">
           <p:sp>
             <p:nvSpPr>
               <p:cNvPr id="51" name="CuadroTexto 50"/>
@@ -4892,7 +4890,7 @@
             </p:txBody>
           </p:sp>
         </mc:Choice>
-        <mc:Fallback>
+        <mc:Fallback xmlns="">
           <p:sp>
             <p:nvSpPr>
               <p:cNvPr id="51" name="CuadroTexto 50"/>
@@ -4931,8 +4929,8 @@
           </p:sp>
         </mc:Fallback>
       </mc:AlternateContent>
-      <mc:AlternateContent xmlns:mc="http://schemas.openxmlformats.org/markup-compatibility/2006">
-        <mc:Choice xmlns:a14="http://schemas.microsoft.com/office/drawing/2010/main" Requires="a14">
+      <mc:AlternateContent xmlns:mc="http://schemas.openxmlformats.org/markup-compatibility/2006" xmlns:a14="http://schemas.microsoft.com/office/drawing/2010/main">
+        <mc:Choice Requires="a14">
           <p:sp>
             <p:nvSpPr>
               <p:cNvPr id="52" name="CuadroTexto 51"/>
@@ -4983,7 +4981,7 @@
             </p:txBody>
           </p:sp>
         </mc:Choice>
-        <mc:Fallback>
+        <mc:Fallback xmlns="">
           <p:sp>
             <p:nvSpPr>
               <p:cNvPr id="52" name="CuadroTexto 51"/>
@@ -5022,8 +5020,8 @@
           </p:sp>
         </mc:Fallback>
       </mc:AlternateContent>
-      <mc:AlternateContent xmlns:mc="http://schemas.openxmlformats.org/markup-compatibility/2006">
-        <mc:Choice xmlns:a14="http://schemas.microsoft.com/office/drawing/2010/main" Requires="a14">
+      <mc:AlternateContent xmlns:mc="http://schemas.openxmlformats.org/markup-compatibility/2006" xmlns:a14="http://schemas.microsoft.com/office/drawing/2010/main">
+        <mc:Choice Requires="a14">
           <p:sp>
             <p:nvSpPr>
               <p:cNvPr id="53" name="CuadroTexto 52"/>
@@ -5074,7 +5072,7 @@
             </p:txBody>
           </p:sp>
         </mc:Choice>
-        <mc:Fallback>
+        <mc:Fallback xmlns="">
           <p:sp>
             <p:nvSpPr>
               <p:cNvPr id="53" name="CuadroTexto 52"/>
@@ -5113,8 +5111,8 @@
           </p:sp>
         </mc:Fallback>
       </mc:AlternateContent>
-      <mc:AlternateContent xmlns:mc="http://schemas.openxmlformats.org/markup-compatibility/2006">
-        <mc:Choice xmlns:a14="http://schemas.microsoft.com/office/drawing/2010/main" Requires="a14">
+      <mc:AlternateContent xmlns:mc="http://schemas.openxmlformats.org/markup-compatibility/2006" xmlns:a14="http://schemas.microsoft.com/office/drawing/2010/main">
+        <mc:Choice Requires="a14">
           <p:sp>
             <p:nvSpPr>
               <p:cNvPr id="54" name="CuadroTexto 53"/>
@@ -5165,7 +5163,7 @@
             </p:txBody>
           </p:sp>
         </mc:Choice>
-        <mc:Fallback>
+        <mc:Fallback xmlns="">
           <p:sp>
             <p:nvSpPr>
               <p:cNvPr id="54" name="CuadroTexto 53"/>
@@ -5204,8 +5202,8 @@
           </p:sp>
         </mc:Fallback>
       </mc:AlternateContent>
-      <mc:AlternateContent xmlns:mc="http://schemas.openxmlformats.org/markup-compatibility/2006">
-        <mc:Choice xmlns:a14="http://schemas.microsoft.com/office/drawing/2010/main" Requires="a14">
+      <mc:AlternateContent xmlns:mc="http://schemas.openxmlformats.org/markup-compatibility/2006" xmlns:a14="http://schemas.microsoft.com/office/drawing/2010/main">
+        <mc:Choice Requires="a14">
           <p:sp>
             <p:nvSpPr>
               <p:cNvPr id="55" name="CuadroTexto 54"/>
@@ -5256,7 +5254,7 @@
             </p:txBody>
           </p:sp>
         </mc:Choice>
-        <mc:Fallback>
+        <mc:Fallback xmlns="">
           <p:sp>
             <p:nvSpPr>
               <p:cNvPr id="55" name="CuadroTexto 54"/>
@@ -5319,8 +5317,8 @@
           </a:prstGeom>
         </p:spPr>
       </p:pic>
-      <mc:AlternateContent xmlns:mc="http://schemas.openxmlformats.org/markup-compatibility/2006">
-        <mc:Choice xmlns:a14="http://schemas.microsoft.com/office/drawing/2010/main" Requires="a14">
+      <mc:AlternateContent xmlns:mc="http://schemas.openxmlformats.org/markup-compatibility/2006" xmlns:a14="http://schemas.microsoft.com/office/drawing/2010/main">
+        <mc:Choice Requires="a14">
           <p:sp>
             <p:nvSpPr>
               <p:cNvPr id="57" name="CuadroTexto 56"/>
@@ -5371,7 +5369,7 @@
             </p:txBody>
           </p:sp>
         </mc:Choice>
-        <mc:Fallback>
+        <mc:Fallback xmlns="">
           <p:sp>
             <p:nvSpPr>
               <p:cNvPr id="57" name="CuadroTexto 56"/>
@@ -5410,8 +5408,8 @@
           </p:sp>
         </mc:Fallback>
       </mc:AlternateContent>
-      <mc:AlternateContent xmlns:mc="http://schemas.openxmlformats.org/markup-compatibility/2006">
-        <mc:Choice xmlns:a14="http://schemas.microsoft.com/office/drawing/2010/main" Requires="a14">
+      <mc:AlternateContent xmlns:mc="http://schemas.openxmlformats.org/markup-compatibility/2006" xmlns:a14="http://schemas.microsoft.com/office/drawing/2010/main">
+        <mc:Choice Requires="a14">
           <p:sp>
             <p:nvSpPr>
               <p:cNvPr id="58" name="CuadroTexto 57"/>
@@ -5462,7 +5460,7 @@
             </p:txBody>
           </p:sp>
         </mc:Choice>
-        <mc:Fallback>
+        <mc:Fallback xmlns="">
           <p:sp>
             <p:nvSpPr>
               <p:cNvPr id="58" name="CuadroTexto 57"/>
@@ -5501,8 +5499,8 @@
           </p:sp>
         </mc:Fallback>
       </mc:AlternateContent>
-      <mc:AlternateContent xmlns:mc="http://schemas.openxmlformats.org/markup-compatibility/2006">
-        <mc:Choice xmlns:a14="http://schemas.microsoft.com/office/drawing/2010/main" Requires="a14">
+      <mc:AlternateContent xmlns:mc="http://schemas.openxmlformats.org/markup-compatibility/2006" xmlns:a14="http://schemas.microsoft.com/office/drawing/2010/main">
+        <mc:Choice Requires="a14">
           <p:sp>
             <p:nvSpPr>
               <p:cNvPr id="59" name="CuadroTexto 58"/>
@@ -5553,7 +5551,7 @@
             </p:txBody>
           </p:sp>
         </mc:Choice>
-        <mc:Fallback>
+        <mc:Fallback xmlns="">
           <p:sp>
             <p:nvSpPr>
               <p:cNvPr id="59" name="CuadroTexto 58"/>
@@ -5592,8 +5590,8 @@
           </p:sp>
         </mc:Fallback>
       </mc:AlternateContent>
-      <mc:AlternateContent xmlns:mc="http://schemas.openxmlformats.org/markup-compatibility/2006">
-        <mc:Choice xmlns:a14="http://schemas.microsoft.com/office/drawing/2010/main" Requires="a14">
+      <mc:AlternateContent xmlns:mc="http://schemas.openxmlformats.org/markup-compatibility/2006" xmlns:a14="http://schemas.microsoft.com/office/drawing/2010/main">
+        <mc:Choice Requires="a14">
           <p:sp>
             <p:nvSpPr>
               <p:cNvPr id="60" name="CuadroTexto 59"/>
@@ -5644,7 +5642,7 @@
             </p:txBody>
           </p:sp>
         </mc:Choice>
-        <mc:Fallback>
+        <mc:Fallback xmlns="">
           <p:sp>
             <p:nvSpPr>
               <p:cNvPr id="60" name="CuadroTexto 59"/>
@@ -5716,11 +5714,7 @@
             </a:pPr>
             <a:r>
               <a:rPr lang="es-CO" sz="1400" dirty="0" smtClean="0"/>
-              <a:t>Tubo de </a:t>
-            </a:r>
-            <a:r>
-              <a:rPr lang="es-CO" sz="1400" dirty="0" smtClean="0"/>
-              <a:t>manubrio</a:t>
+              <a:t>Tubo de manubrio</a:t>
             </a:r>
           </a:p>
           <a:p>
@@ -5731,7 +5725,6 @@
               <a:rPr lang="es-CO" sz="1400" dirty="0" smtClean="0"/>
               <a:t>Espaciadores</a:t>
             </a:r>
-            <a:endParaRPr lang="es-CO" sz="1400" dirty="0" smtClean="0"/>
           </a:p>
           <a:p>
             <a:pPr marL="342900" indent="-342900">
@@ -5760,7 +5753,6 @@
               <a:rPr lang="es-CO" sz="1400" dirty="0" smtClean="0"/>
               <a:t>Tapón</a:t>
             </a:r>
-            <a:endParaRPr lang="es-CO" sz="1400" dirty="0" smtClean="0"/>
           </a:p>
         </p:txBody>
       </p:sp>
@@ -5884,7 +5876,6 @@
               <a:rPr lang="es-CO" sz="1400" dirty="0" smtClean="0"/>
               <a:t>Sillín</a:t>
             </a:r>
-            <a:endParaRPr lang="es-CO" sz="1400" dirty="0" smtClean="0"/>
           </a:p>
           <a:p>
             <a:pPr marL="285750" indent="-285750">
@@ -5957,8 +5948,8 @@
           </a:prstGeom>
         </p:spPr>
       </p:pic>
-      <mc:AlternateContent xmlns:mc="http://schemas.openxmlformats.org/markup-compatibility/2006">
-        <mc:Choice xmlns:a14="http://schemas.microsoft.com/office/drawing/2010/main" Requires="a14">
+      <mc:AlternateContent xmlns:mc="http://schemas.openxmlformats.org/markup-compatibility/2006" xmlns:a14="http://schemas.microsoft.com/office/drawing/2010/main">
+        <mc:Choice Requires="a14">
           <p:sp>
             <p:nvSpPr>
               <p:cNvPr id="46" name="CuadroTexto 45"/>
@@ -6009,7 +6000,7 @@
             </p:txBody>
           </p:sp>
         </mc:Choice>
-        <mc:Fallback>
+        <mc:Fallback xmlns="">
           <p:sp>
             <p:nvSpPr>
               <p:cNvPr id="46" name="CuadroTexto 45"/>
@@ -6048,8 +6039,8 @@
           </p:sp>
         </mc:Fallback>
       </mc:AlternateContent>
-      <mc:AlternateContent xmlns:mc="http://schemas.openxmlformats.org/markup-compatibility/2006">
-        <mc:Choice xmlns:a14="http://schemas.microsoft.com/office/drawing/2010/main" Requires="a14">
+      <mc:AlternateContent xmlns:mc="http://schemas.openxmlformats.org/markup-compatibility/2006" xmlns:a14="http://schemas.microsoft.com/office/drawing/2010/main">
+        <mc:Choice Requires="a14">
           <p:sp>
             <p:nvSpPr>
               <p:cNvPr id="65" name="CuadroTexto 64"/>
@@ -6100,7 +6091,7 @@
             </p:txBody>
           </p:sp>
         </mc:Choice>
-        <mc:Fallback>
+        <mc:Fallback xmlns="">
           <p:sp>
             <p:nvSpPr>
               <p:cNvPr id="65" name="CuadroTexto 64"/>
@@ -6139,8 +6130,8 @@
           </p:sp>
         </mc:Fallback>
       </mc:AlternateContent>
-      <mc:AlternateContent xmlns:mc="http://schemas.openxmlformats.org/markup-compatibility/2006">
-        <mc:Choice xmlns:a14="http://schemas.microsoft.com/office/drawing/2010/main" Requires="a14">
+      <mc:AlternateContent xmlns:mc="http://schemas.openxmlformats.org/markup-compatibility/2006" xmlns:a14="http://schemas.microsoft.com/office/drawing/2010/main">
+        <mc:Choice Requires="a14">
           <p:sp>
             <p:nvSpPr>
               <p:cNvPr id="66" name="CuadroTexto 65"/>
@@ -6191,7 +6182,7 @@
             </p:txBody>
           </p:sp>
         </mc:Choice>
-        <mc:Fallback>
+        <mc:Fallback xmlns="">
           <p:sp>
             <p:nvSpPr>
               <p:cNvPr id="66" name="CuadroTexto 65"/>
@@ -6230,8 +6221,8 @@
           </p:sp>
         </mc:Fallback>
       </mc:AlternateContent>
-      <mc:AlternateContent xmlns:mc="http://schemas.openxmlformats.org/markup-compatibility/2006">
-        <mc:Choice xmlns:a14="http://schemas.microsoft.com/office/drawing/2010/main" Requires="a14">
+      <mc:AlternateContent xmlns:mc="http://schemas.openxmlformats.org/markup-compatibility/2006" xmlns:a14="http://schemas.microsoft.com/office/drawing/2010/main">
+        <mc:Choice Requires="a14">
           <p:sp>
             <p:nvSpPr>
               <p:cNvPr id="67" name="CuadroTexto 66"/>
@@ -6282,7 +6273,7 @@
             </p:txBody>
           </p:sp>
         </mc:Choice>
-        <mc:Fallback>
+        <mc:Fallback xmlns="">
           <p:sp>
             <p:nvSpPr>
               <p:cNvPr id="67" name="CuadroTexto 66"/>
@@ -6321,8 +6312,8 @@
           </p:sp>
         </mc:Fallback>
       </mc:AlternateContent>
-      <mc:AlternateContent xmlns:mc="http://schemas.openxmlformats.org/markup-compatibility/2006">
-        <mc:Choice xmlns:a14="http://schemas.microsoft.com/office/drawing/2010/main" Requires="a14">
+      <mc:AlternateContent xmlns:mc="http://schemas.openxmlformats.org/markup-compatibility/2006" xmlns:a14="http://schemas.microsoft.com/office/drawing/2010/main">
+        <mc:Choice Requires="a14">
           <p:sp>
             <p:nvSpPr>
               <p:cNvPr id="68" name="CuadroTexto 67"/>
@@ -6373,7 +6364,7 @@
             </p:txBody>
           </p:sp>
         </mc:Choice>
-        <mc:Fallback>
+        <mc:Fallback xmlns="">
           <p:sp>
             <p:nvSpPr>
               <p:cNvPr id="68" name="CuadroTexto 67"/>
@@ -6412,8 +6403,8 @@
           </p:sp>
         </mc:Fallback>
       </mc:AlternateContent>
-      <mc:AlternateContent xmlns:mc="http://schemas.openxmlformats.org/markup-compatibility/2006">
-        <mc:Choice xmlns:a14="http://schemas.microsoft.com/office/drawing/2010/main" Requires="a14">
+      <mc:AlternateContent xmlns:mc="http://schemas.openxmlformats.org/markup-compatibility/2006" xmlns:a14="http://schemas.microsoft.com/office/drawing/2010/main">
+        <mc:Choice Requires="a14">
           <p:sp>
             <p:nvSpPr>
               <p:cNvPr id="69" name="CuadroTexto 68"/>
@@ -6464,7 +6455,7 @@
             </p:txBody>
           </p:sp>
         </mc:Choice>
-        <mc:Fallback>
+        <mc:Fallback xmlns="">
           <p:sp>
             <p:nvSpPr>
               <p:cNvPr id="69" name="CuadroTexto 68"/>
@@ -6507,6 +6498,454 @@
     <p:extLst>
       <p:ext uri="{BB962C8B-B14F-4D97-AF65-F5344CB8AC3E}">
         <p14:creationId xmlns:p14="http://schemas.microsoft.com/office/powerpoint/2010/main" val="3438802664"/>
+      </p:ext>
+    </p:extLst>
+  </p:cSld>
+  <p:clrMapOvr>
+    <a:masterClrMapping/>
+  </p:clrMapOvr>
+</p:sld>
+</file>
+
+<file path=ppt/slides/slide2.xml><?xml version="1.0" encoding="utf-8"?>
+<p:sld xmlns:a="http://schemas.openxmlformats.org/drawingml/2006/main" xmlns:r="http://schemas.openxmlformats.org/officeDocument/2006/relationships" xmlns:p="http://schemas.openxmlformats.org/presentationml/2006/main">
+  <p:cSld>
+    <p:spTree>
+      <p:nvGrpSpPr>
+        <p:cNvPr id="1" name=""/>
+        <p:cNvGrpSpPr/>
+        <p:nvPr/>
+      </p:nvGrpSpPr>
+      <p:grpSpPr>
+        <a:xfrm>
+          <a:off x="0" y="0"/>
+          <a:ext cx="0" cy="0"/>
+          <a:chOff x="0" y="0"/>
+          <a:chExt cx="0" cy="0"/>
+        </a:xfrm>
+      </p:grpSpPr>
+      <p:sp>
+        <p:nvSpPr>
+          <p:cNvPr id="2" name="Título 1"/>
+          <p:cNvSpPr>
+            <a:spLocks noGrp="1"/>
+          </p:cNvSpPr>
+          <p:nvPr>
+            <p:ph type="title"/>
+          </p:nvPr>
+        </p:nvSpPr>
+        <p:spPr/>
+        <p:txBody>
+          <a:bodyPr/>
+          <a:lstStyle/>
+          <a:p>
+            <a:r>
+              <a:rPr lang="es-CO" dirty="0" smtClean="0"/>
+              <a:t>Componentes de fabricación</a:t>
+            </a:r>
+            <a:endParaRPr lang="es-CO" dirty="0"/>
+          </a:p>
+        </p:txBody>
+      </p:sp>
+      <p:sp>
+        <p:nvSpPr>
+          <p:cNvPr id="3" name="Marcador de contenido 2"/>
+          <p:cNvSpPr>
+            <a:spLocks noGrp="1"/>
+          </p:cNvSpPr>
+          <p:nvPr>
+            <p:ph idx="1"/>
+          </p:nvPr>
+        </p:nvSpPr>
+        <p:spPr/>
+        <p:txBody>
+          <a:bodyPr numCol="2">
+            <a:normAutofit/>
+          </a:bodyPr>
+          <a:lstStyle/>
+          <a:p>
+            <a:pPr marL="514350" indent="-514350">
+              <a:buAutoNum type="arabicPeriod"/>
+            </a:pPr>
+            <a:r>
+              <a:rPr lang="es-CO" dirty="0" smtClean="0"/>
+              <a:t>Tubo superior</a:t>
+            </a:r>
+          </a:p>
+          <a:p>
+            <a:pPr marL="514350" indent="-514350">
+              <a:buAutoNum type="arabicPeriod"/>
+            </a:pPr>
+            <a:r>
+              <a:rPr lang="es-CO" dirty="0" smtClean="0"/>
+              <a:t>Tubo inferior</a:t>
+            </a:r>
+          </a:p>
+          <a:p>
+            <a:pPr marL="514350" indent="-514350">
+              <a:buAutoNum type="arabicPeriod"/>
+            </a:pPr>
+            <a:r>
+              <a:rPr lang="es-CO" dirty="0" smtClean="0"/>
+              <a:t>Tubo del asiento</a:t>
+            </a:r>
+          </a:p>
+          <a:p>
+            <a:pPr marL="514350" indent="-514350">
+              <a:buAutoNum type="arabicPeriod"/>
+            </a:pPr>
+            <a:r>
+              <a:rPr lang="es-CO" dirty="0" smtClean="0"/>
+              <a:t>Vaina superior </a:t>
+            </a:r>
+          </a:p>
+          <a:p>
+            <a:pPr marL="514350" indent="-514350">
+              <a:buAutoNum type="arabicPeriod"/>
+            </a:pPr>
+            <a:r>
+              <a:rPr lang="es-CO" dirty="0" smtClean="0"/>
+              <a:t>Vaina inferior</a:t>
+            </a:r>
+          </a:p>
+          <a:p>
+            <a:pPr marL="514350" indent="-514350">
+              <a:buAutoNum type="arabicPeriod"/>
+            </a:pPr>
+            <a:r>
+              <a:rPr lang="es-CO" dirty="0" smtClean="0"/>
+              <a:t>Punteras</a:t>
+            </a:r>
+          </a:p>
+          <a:p>
+            <a:pPr marL="514350" indent="-514350">
+              <a:buAutoNum type="arabicPeriod"/>
+            </a:pPr>
+            <a:r>
+              <a:rPr lang="es-CO" dirty="0" smtClean="0"/>
+              <a:t>Telescopio</a:t>
+            </a:r>
+          </a:p>
+          <a:p>
+            <a:pPr marL="514350" indent="-514350">
+              <a:buAutoNum type="arabicPeriod"/>
+            </a:pPr>
+            <a:r>
+              <a:rPr lang="es-CO" dirty="0" smtClean="0"/>
+              <a:t>Manga asiento</a:t>
+            </a:r>
+          </a:p>
+          <a:p>
+            <a:pPr marL="514350" indent="-514350">
+              <a:buAutoNum type="arabicPeriod"/>
+            </a:pPr>
+            <a:r>
+              <a:rPr lang="es-CO" dirty="0" err="1" smtClean="0"/>
+              <a:t>Pedalier</a:t>
+            </a:r>
+            <a:endParaRPr lang="es-CO" dirty="0" smtClean="0"/>
+          </a:p>
+          <a:p>
+            <a:pPr marL="514350" indent="-514350">
+              <a:buAutoNum type="arabicPeriod"/>
+            </a:pPr>
+            <a:r>
+              <a:rPr lang="es-CO" dirty="0" smtClean="0"/>
+              <a:t>Tubo de manubrio</a:t>
+            </a:r>
+          </a:p>
+          <a:p>
+            <a:pPr marL="514350" indent="-514350">
+              <a:buAutoNum type="arabicPeriod"/>
+            </a:pPr>
+            <a:r>
+              <a:rPr lang="es-CO" dirty="0" smtClean="0"/>
+              <a:t>Tija</a:t>
+            </a:r>
+          </a:p>
+          <a:p>
+            <a:pPr marL="514350" indent="-514350">
+              <a:buAutoNum type="arabicPeriod"/>
+            </a:pPr>
+            <a:r>
+              <a:rPr lang="es-CO" dirty="0" smtClean="0"/>
+              <a:t>Horquilla</a:t>
+            </a:r>
+            <a:endParaRPr lang="es-CO" dirty="0"/>
+          </a:p>
+        </p:txBody>
+      </p:sp>
+    </p:spTree>
+    <p:extLst>
+      <p:ext uri="{BB962C8B-B14F-4D97-AF65-F5344CB8AC3E}">
+        <p14:creationId xmlns:p14="http://schemas.microsoft.com/office/powerpoint/2010/main" val="1243428478"/>
+      </p:ext>
+    </p:extLst>
+  </p:cSld>
+  <p:clrMapOvr>
+    <a:masterClrMapping/>
+  </p:clrMapOvr>
+</p:sld>
+</file>
+
+<file path=ppt/slides/slide3.xml><?xml version="1.0" encoding="utf-8"?>
+<p:sld xmlns:a="http://schemas.openxmlformats.org/drawingml/2006/main" xmlns:r="http://schemas.openxmlformats.org/officeDocument/2006/relationships" xmlns:p="http://schemas.openxmlformats.org/presentationml/2006/main">
+  <p:cSld>
+    <p:spTree>
+      <p:nvGrpSpPr>
+        <p:cNvPr id="1" name=""/>
+        <p:cNvGrpSpPr/>
+        <p:nvPr/>
+      </p:nvGrpSpPr>
+      <p:grpSpPr>
+        <a:xfrm>
+          <a:off x="0" y="0"/>
+          <a:ext cx="0" cy="0"/>
+          <a:chOff x="0" y="0"/>
+          <a:chExt cx="0" cy="0"/>
+        </a:xfrm>
+      </p:grpSpPr>
+      <p:sp>
+        <p:nvSpPr>
+          <p:cNvPr id="2" name="Título 1"/>
+          <p:cNvSpPr>
+            <a:spLocks noGrp="1"/>
+          </p:cNvSpPr>
+          <p:nvPr>
+            <p:ph type="title"/>
+          </p:nvPr>
+        </p:nvSpPr>
+        <p:spPr/>
+        <p:txBody>
+          <a:bodyPr/>
+          <a:lstStyle/>
+          <a:p>
+            <a:r>
+              <a:rPr lang="es-CO" dirty="0" smtClean="0"/>
+              <a:t>Componentes de selección</a:t>
+            </a:r>
+            <a:endParaRPr lang="es-CO" dirty="0"/>
+          </a:p>
+        </p:txBody>
+      </p:sp>
+      <p:sp>
+        <p:nvSpPr>
+          <p:cNvPr id="3" name="Marcador de contenido 2"/>
+          <p:cNvSpPr>
+            <a:spLocks noGrp="1"/>
+          </p:cNvSpPr>
+          <p:nvPr>
+            <p:ph idx="1"/>
+          </p:nvPr>
+        </p:nvSpPr>
+        <p:spPr/>
+        <p:txBody>
+          <a:bodyPr numCol="2">
+            <a:normAutofit fontScale="85000" lnSpcReduction="20000"/>
+          </a:bodyPr>
+          <a:lstStyle/>
+          <a:p>
+            <a:pPr marL="514350" indent="-514350">
+              <a:buAutoNum type="arabicPeriod"/>
+            </a:pPr>
+            <a:r>
+              <a:rPr lang="es-CO" dirty="0" smtClean="0"/>
+              <a:t>Cadena</a:t>
+            </a:r>
+            <a:endParaRPr lang="es-CO" dirty="0"/>
+          </a:p>
+          <a:p>
+            <a:pPr marL="514350" indent="-514350">
+              <a:buAutoNum type="arabicPeriod"/>
+            </a:pPr>
+            <a:r>
+              <a:rPr lang="es-CO" dirty="0" smtClean="0"/>
+              <a:t>Estrella</a:t>
+            </a:r>
+          </a:p>
+          <a:p>
+            <a:pPr marL="514350" indent="-514350">
+              <a:buAutoNum type="arabicPeriod"/>
+            </a:pPr>
+            <a:r>
+              <a:rPr lang="es-CO" dirty="0" smtClean="0"/>
+              <a:t>Pedal</a:t>
+            </a:r>
+          </a:p>
+          <a:p>
+            <a:pPr marL="514350" indent="-514350">
+              <a:buAutoNum type="arabicPeriod"/>
+            </a:pPr>
+            <a:r>
+              <a:rPr lang="es-CO" dirty="0" smtClean="0"/>
+              <a:t>Biela</a:t>
+            </a:r>
+          </a:p>
+          <a:p>
+            <a:pPr marL="514350" indent="-514350">
+              <a:buAutoNum type="arabicPeriod"/>
+            </a:pPr>
+            <a:r>
+              <a:rPr lang="es-CO" dirty="0" smtClean="0"/>
+              <a:t>Cambios</a:t>
+            </a:r>
+          </a:p>
+          <a:p>
+            <a:pPr marL="514350" indent="-514350">
+              <a:buAutoNum type="arabicPeriod"/>
+            </a:pPr>
+            <a:r>
+              <a:rPr lang="es-CO" dirty="0" smtClean="0"/>
+              <a:t>Eje </a:t>
+            </a:r>
+            <a:r>
+              <a:rPr lang="es-CO" dirty="0" err="1" smtClean="0"/>
+              <a:t>pedalier</a:t>
+            </a:r>
+            <a:endParaRPr lang="es-CO" dirty="0"/>
+          </a:p>
+          <a:p>
+            <a:pPr marL="514350" indent="-514350">
+              <a:buAutoNum type="arabicPeriod"/>
+            </a:pPr>
+            <a:r>
+              <a:rPr lang="es-CO" dirty="0" smtClean="0"/>
+              <a:t>Neumático</a:t>
+            </a:r>
+          </a:p>
+          <a:p>
+            <a:pPr marL="514350" indent="-514350">
+              <a:buAutoNum type="arabicPeriod"/>
+            </a:pPr>
+            <a:r>
+              <a:rPr lang="es-CO" dirty="0" smtClean="0"/>
+              <a:t>Cubierta</a:t>
+            </a:r>
+          </a:p>
+          <a:p>
+            <a:pPr marL="514350" indent="-514350">
+              <a:buAutoNum type="arabicPeriod"/>
+            </a:pPr>
+            <a:r>
+              <a:rPr lang="es-CO" dirty="0" smtClean="0"/>
+              <a:t>Rin</a:t>
+            </a:r>
+          </a:p>
+          <a:p>
+            <a:pPr marL="514350" indent="-514350">
+              <a:buAutoNum type="arabicPeriod"/>
+            </a:pPr>
+            <a:r>
+              <a:rPr lang="es-CO" dirty="0" smtClean="0"/>
+              <a:t>Manzana</a:t>
+            </a:r>
+          </a:p>
+          <a:p>
+            <a:pPr marL="514350" indent="-514350">
+              <a:buAutoNum type="arabicPeriod"/>
+            </a:pPr>
+            <a:r>
+              <a:rPr lang="es-CO" dirty="0" smtClean="0"/>
+              <a:t>Rayos</a:t>
+            </a:r>
+          </a:p>
+          <a:p>
+            <a:pPr marL="514350" indent="-514350">
+              <a:buAutoNum type="arabicPeriod"/>
+            </a:pPr>
+            <a:r>
+              <a:rPr lang="es-CO" dirty="0" smtClean="0"/>
+              <a:t>Buje</a:t>
+            </a:r>
+          </a:p>
+          <a:p>
+            <a:pPr marL="514350" indent="-514350">
+              <a:buAutoNum type="arabicPeriod"/>
+            </a:pPr>
+            <a:r>
+              <a:rPr lang="es-CO" dirty="0" smtClean="0"/>
+              <a:t>Freno</a:t>
+            </a:r>
+          </a:p>
+          <a:p>
+            <a:pPr marL="514350" indent="-514350">
+              <a:buAutoNum type="arabicPeriod"/>
+            </a:pPr>
+            <a:r>
+              <a:rPr lang="es-CO" dirty="0" smtClean="0"/>
+              <a:t>Piñones</a:t>
+            </a:r>
+          </a:p>
+          <a:p>
+            <a:pPr marL="514350" indent="-514350">
+              <a:buAutoNum type="arabicPeriod"/>
+            </a:pPr>
+            <a:r>
+              <a:rPr lang="es-CO" dirty="0" smtClean="0"/>
+              <a:t>Espaciadores</a:t>
+            </a:r>
+          </a:p>
+          <a:p>
+            <a:pPr marL="514350" indent="-514350">
+              <a:buAutoNum type="arabicPeriod"/>
+            </a:pPr>
+            <a:r>
+              <a:rPr lang="es-CO" dirty="0" smtClean="0"/>
+              <a:t>Potencia </a:t>
+            </a:r>
+          </a:p>
+          <a:p>
+            <a:pPr marL="514350" indent="-514350">
+              <a:buAutoNum type="arabicPeriod"/>
+            </a:pPr>
+            <a:r>
+              <a:rPr lang="es-CO" dirty="0" smtClean="0"/>
+              <a:t>Mangos</a:t>
+            </a:r>
+          </a:p>
+          <a:p>
+            <a:pPr marL="514350" indent="-514350">
+              <a:buAutoNum type="arabicPeriod"/>
+            </a:pPr>
+            <a:r>
+              <a:rPr lang="es-CO" dirty="0" smtClean="0"/>
+              <a:t>Tapón</a:t>
+            </a:r>
+          </a:p>
+          <a:p>
+            <a:pPr marL="514350" indent="-514350">
+              <a:buAutoNum type="arabicPeriod"/>
+            </a:pPr>
+            <a:r>
+              <a:rPr lang="es-CO" dirty="0" smtClean="0"/>
+              <a:t>Sillín</a:t>
+            </a:r>
+          </a:p>
+          <a:p>
+            <a:pPr marL="514350" indent="-514350">
+              <a:buAutoNum type="arabicPeriod"/>
+            </a:pPr>
+            <a:r>
+              <a:rPr lang="es-CO" dirty="0" smtClean="0"/>
+              <a:t>Control de cambios</a:t>
+            </a:r>
+          </a:p>
+          <a:p>
+            <a:pPr marL="514350" indent="-514350">
+              <a:buAutoNum type="arabicPeriod"/>
+            </a:pPr>
+            <a:r>
+              <a:rPr lang="es-CO" dirty="0" smtClean="0"/>
+              <a:t>Control de frenos</a:t>
+            </a:r>
+            <a:endParaRPr lang="es-CO" dirty="0"/>
+          </a:p>
+        </p:txBody>
+      </p:sp>
+    </p:spTree>
+    <p:extLst>
+      <p:ext uri="{BB962C8B-B14F-4D97-AF65-F5344CB8AC3E}">
+        <p14:creationId xmlns:p14="http://schemas.microsoft.com/office/powerpoint/2010/main" val="3790780412"/>
       </p:ext>
     </p:extLst>
   </p:cSld>

</xml_diff>